<commit_message>
Vault backup: 01/02/24 19:31:35 ASUS
Affected files:
.obsidian/workspace.json
ITP/Theorie/Netzplan_Gantt.pdf
ITP/Theorie/Uebung-Netzplantechnik-Aufgabenstellung.pptx
</commit_message>
<xml_diff>
--- a/ITP/Theorie/Uebung-Netzplantechnik-Aufgabenstellung.pptx
+++ b/ITP/Theorie/Uebung-Netzplantechnik-Aufgabenstellung.pptx
@@ -2,14 +2,14 @@
 <file path=ppt/presentation.xml><?xml version="1.0" encoding="utf-8"?>
 <p:presentation xmlns:a="http://schemas.openxmlformats.org/drawingml/2006/main" xmlns:r="http://schemas.openxmlformats.org/officeDocument/2006/relationships" xmlns:p="http://schemas.openxmlformats.org/presentationml/2006/main" saveSubsetFonts="1" autoCompressPictures="0">
   <p:sldMasterIdLst>
-    <p:sldMasterId id="2147483648" r:id="rId1"/>
+    <p:sldMasterId id="2147483648" r:id="rId3"/>
   </p:sldMasterIdLst>
   <p:sldIdLst>
-    <p:sldId id="263" r:id="rId2"/>
-    <p:sldId id="275" r:id="rId3"/>
-    <p:sldId id="264" r:id="rId4"/>
-    <p:sldId id="265" r:id="rId5"/>
-    <p:sldId id="266" r:id="rId6"/>
+    <p:sldId id="263" r:id="rId4"/>
+    <p:sldId id="275" r:id="rId5"/>
+    <p:sldId id="264" r:id="rId6"/>
+    <p:sldId id="265" r:id="rId7"/>
+    <p:sldId id="266" r:id="rId8"/>
   </p:sldIdLst>
   <p:sldSz cx="9144000" cy="6858000" type="screen4x3"/>
   <p:notesSz cx="6858000" cy="9144000"/>
@@ -314,7 +314,7 @@
           <a:p>
             <a:fld id="{1A11056B-4FE9-D742-9823-BE92F52EF1C3}" type="datetimeFigureOut">
               <a:rPr lang="de-DE" smtClean="0"/>
-              <a:t>18.11.22</a:t>
+              <a:t>01.02.2024</a:t>
             </a:fld>
             <a:endParaRPr lang="de-DE"/>
           </a:p>
@@ -490,7 +490,7 @@
           <a:p>
             <a:fld id="{1A11056B-4FE9-D742-9823-BE92F52EF1C3}" type="datetimeFigureOut">
               <a:rPr lang="de-DE" smtClean="0"/>
-              <a:t>18.11.22</a:t>
+              <a:t>01.02.2024</a:t>
             </a:fld>
             <a:endParaRPr lang="de-DE"/>
           </a:p>
@@ -676,7 +676,7 @@
           <a:p>
             <a:fld id="{1A11056B-4FE9-D742-9823-BE92F52EF1C3}" type="datetimeFigureOut">
               <a:rPr lang="de-DE" smtClean="0"/>
-              <a:t>18.11.22</a:t>
+              <a:t>01.02.2024</a:t>
             </a:fld>
             <a:endParaRPr lang="de-DE"/>
           </a:p>
@@ -852,7 +852,7 @@
           <a:p>
             <a:fld id="{1A11056B-4FE9-D742-9823-BE92F52EF1C3}" type="datetimeFigureOut">
               <a:rPr lang="de-DE" smtClean="0"/>
-              <a:t>18.11.22</a:t>
+              <a:t>01.02.2024</a:t>
             </a:fld>
             <a:endParaRPr lang="de-DE"/>
           </a:p>
@@ -1105,7 +1105,7 @@
           <a:p>
             <a:fld id="{1A11056B-4FE9-D742-9823-BE92F52EF1C3}" type="datetimeFigureOut">
               <a:rPr lang="de-DE" smtClean="0"/>
-              <a:t>18.11.22</a:t>
+              <a:t>01.02.2024</a:t>
             </a:fld>
             <a:endParaRPr lang="de-DE"/>
           </a:p>
@@ -1398,7 +1398,7 @@
           <a:p>
             <a:fld id="{1A11056B-4FE9-D742-9823-BE92F52EF1C3}" type="datetimeFigureOut">
               <a:rPr lang="de-DE" smtClean="0"/>
-              <a:t>18.11.22</a:t>
+              <a:t>01.02.2024</a:t>
             </a:fld>
             <a:endParaRPr lang="de-DE"/>
           </a:p>
@@ -1825,7 +1825,7 @@
           <a:p>
             <a:fld id="{1A11056B-4FE9-D742-9823-BE92F52EF1C3}" type="datetimeFigureOut">
               <a:rPr lang="de-DE" smtClean="0"/>
-              <a:t>18.11.22</a:t>
+              <a:t>01.02.2024</a:t>
             </a:fld>
             <a:endParaRPr lang="de-DE"/>
           </a:p>
@@ -1950,7 +1950,7 @@
           <a:p>
             <a:fld id="{1A11056B-4FE9-D742-9823-BE92F52EF1C3}" type="datetimeFigureOut">
               <a:rPr lang="de-DE" smtClean="0"/>
-              <a:t>18.11.22</a:t>
+              <a:t>01.02.2024</a:t>
             </a:fld>
             <a:endParaRPr lang="de-DE"/>
           </a:p>
@@ -2053,7 +2053,7 @@
           <a:p>
             <a:fld id="{1A11056B-4FE9-D742-9823-BE92F52EF1C3}" type="datetimeFigureOut">
               <a:rPr lang="de-DE" smtClean="0"/>
-              <a:t>18.11.22</a:t>
+              <a:t>01.02.2024</a:t>
             </a:fld>
             <a:endParaRPr lang="de-DE"/>
           </a:p>
@@ -2336,7 +2336,7 @@
           <a:p>
             <a:fld id="{1A11056B-4FE9-D742-9823-BE92F52EF1C3}" type="datetimeFigureOut">
               <a:rPr lang="de-DE" smtClean="0"/>
-              <a:t>18.11.22</a:t>
+              <a:t>01.02.2024</a:t>
             </a:fld>
             <a:endParaRPr lang="de-DE"/>
           </a:p>
@@ -2596,7 +2596,7 @@
           <a:p>
             <a:fld id="{1A11056B-4FE9-D742-9823-BE92F52EF1C3}" type="datetimeFigureOut">
               <a:rPr lang="de-DE" smtClean="0"/>
-              <a:t>18.11.22</a:t>
+              <a:t>01.02.2024</a:t>
             </a:fld>
             <a:endParaRPr lang="de-DE"/>
           </a:p>
@@ -6194,7 +6194,7 @@
           <p:nvPr>
             <p:extLst>
               <p:ext uri="{D42A27DB-BD31-4B8C-83A1-F6EECF244321}">
-                <p14:modId xmlns:p14="http://schemas.microsoft.com/office/powerpoint/2010/main" val="4132422869"/>
+                <p14:modId xmlns:p14="http://schemas.microsoft.com/office/powerpoint/2010/main" val="1592780775"/>
               </p:ext>
             </p:extLst>
           </p:nvPr>
@@ -6264,7 +6264,10 @@
                     <a:lstStyle/>
                     <a:p>
                       <a:pPr algn="ctr"/>
-                      <a:endParaRPr lang="de-DE" sz="1200" dirty="0"/>
+                      <a:r>
+                        <a:rPr lang="de-DE" sz="1200" dirty="0"/>
+                        <a:t>10</a:t>
+                      </a:r>
                     </a:p>
                   </a:txBody>
                   <a:tcPr/>
@@ -6282,29 +6285,38 @@
                     <a:lstStyle/>
                     <a:p>
                       <a:pPr algn="ctr"/>
-                      <a:endParaRPr lang="de-DE" sz="1200" dirty="0"/>
-                    </a:p>
-                  </a:txBody>
-                  <a:tcPr/>
-                </a:tc>
-                <a:tc>
-                  <a:txBody>
-                    <a:bodyPr/>
-                    <a:lstStyle/>
-                    <a:p>
-                      <a:pPr algn="ctr"/>
-                      <a:endParaRPr lang="de-DE" sz="1200" dirty="0"/>
-                    </a:p>
-                  </a:txBody>
-                  <a:tcPr/>
-                </a:tc>
-                <a:tc>
-                  <a:txBody>
-                    <a:bodyPr/>
-                    <a:lstStyle/>
-                    <a:p>
-                      <a:pPr algn="ctr"/>
-                      <a:endParaRPr lang="de-DE" sz="1200" dirty="0"/>
+                      <a:r>
+                        <a:rPr lang="de-DE" sz="1200" dirty="0"/>
+                        <a:t>13</a:t>
+                      </a:r>
+                    </a:p>
+                  </a:txBody>
+                  <a:tcPr/>
+                </a:tc>
+                <a:tc>
+                  <a:txBody>
+                    <a:bodyPr/>
+                    <a:lstStyle/>
+                    <a:p>
+                      <a:pPr algn="ctr"/>
+                      <a:r>
+                        <a:rPr lang="de-DE" sz="1200" dirty="0"/>
+                        <a:t>0</a:t>
+                      </a:r>
+                    </a:p>
+                  </a:txBody>
+                  <a:tcPr/>
+                </a:tc>
+                <a:tc>
+                  <a:txBody>
+                    <a:bodyPr/>
+                    <a:lstStyle/>
+                    <a:p>
+                      <a:pPr algn="ctr"/>
+                      <a:r>
+                        <a:rPr lang="de-DE" sz="1200" dirty="0"/>
+                        <a:t>23</a:t>
+                      </a:r>
                     </a:p>
                   </a:txBody>
                   <a:tcPr/>
@@ -6322,29 +6334,38 @@
                     <a:lstStyle/>
                     <a:p>
                       <a:pPr algn="ctr"/>
-                      <a:endParaRPr lang="de-DE" sz="1200"/>
-                    </a:p>
-                  </a:txBody>
-                  <a:tcPr/>
-                </a:tc>
-                <a:tc>
-                  <a:txBody>
-                    <a:bodyPr/>
-                    <a:lstStyle/>
-                    <a:p>
-                      <a:pPr algn="ctr"/>
-                      <a:endParaRPr lang="de-DE" sz="1200" dirty="0"/>
-                    </a:p>
-                  </a:txBody>
-                  <a:tcPr/>
-                </a:tc>
-                <a:tc>
-                  <a:txBody>
-                    <a:bodyPr/>
-                    <a:lstStyle/>
-                    <a:p>
-                      <a:pPr algn="ctr"/>
-                      <a:endParaRPr lang="de-DE" sz="1200" dirty="0"/>
+                      <a:r>
+                        <a:rPr lang="de-DE" sz="1200" dirty="0"/>
+                        <a:t>13</a:t>
+                      </a:r>
+                    </a:p>
+                  </a:txBody>
+                  <a:tcPr/>
+                </a:tc>
+                <a:tc>
+                  <a:txBody>
+                    <a:bodyPr/>
+                    <a:lstStyle/>
+                    <a:p>
+                      <a:pPr algn="ctr"/>
+                      <a:r>
+                        <a:rPr lang="de-DE" sz="1200" dirty="0"/>
+                        <a:t>0</a:t>
+                      </a:r>
+                    </a:p>
+                  </a:txBody>
+                  <a:tcPr/>
+                </a:tc>
+                <a:tc>
+                  <a:txBody>
+                    <a:bodyPr/>
+                    <a:lstStyle/>
+                    <a:p>
+                      <a:pPr algn="ctr"/>
+                      <a:r>
+                        <a:rPr lang="de-DE" sz="1200" dirty="0"/>
+                        <a:t>23</a:t>
+                      </a:r>
                     </a:p>
                   </a:txBody>
                   <a:tcPr/>
@@ -6368,7 +6389,7 @@
           <p:nvPr>
             <p:extLst>
               <p:ext uri="{D42A27DB-BD31-4B8C-83A1-F6EECF244321}">
-                <p14:modId xmlns:p14="http://schemas.microsoft.com/office/powerpoint/2010/main" val="3114206907"/>
+                <p14:modId xmlns:p14="http://schemas.microsoft.com/office/powerpoint/2010/main" val="1651505591"/>
               </p:ext>
             </p:extLst>
           </p:nvPr>
@@ -6438,7 +6459,10 @@
                     <a:lstStyle/>
                     <a:p>
                       <a:pPr algn="ctr"/>
-                      <a:endParaRPr lang="de-DE" sz="1200" dirty="0"/>
+                      <a:r>
+                        <a:rPr lang="de-DE" sz="1200" dirty="0"/>
+                        <a:t>5</a:t>
+                      </a:r>
                     </a:p>
                   </a:txBody>
                   <a:tcPr/>
@@ -6456,29 +6480,38 @@
                     <a:lstStyle/>
                     <a:p>
                       <a:pPr algn="ctr"/>
-                      <a:endParaRPr lang="de-DE" sz="1200" dirty="0"/>
-                    </a:p>
-                  </a:txBody>
-                  <a:tcPr/>
-                </a:tc>
-                <a:tc>
-                  <a:txBody>
-                    <a:bodyPr/>
-                    <a:lstStyle/>
-                    <a:p>
-                      <a:pPr algn="ctr"/>
-                      <a:endParaRPr lang="de-DE" sz="1200" dirty="0"/>
-                    </a:p>
-                  </a:txBody>
-                  <a:tcPr/>
-                </a:tc>
-                <a:tc>
-                  <a:txBody>
-                    <a:bodyPr/>
-                    <a:lstStyle/>
-                    <a:p>
-                      <a:pPr algn="ctr"/>
-                      <a:endParaRPr lang="de-DE" sz="1200" dirty="0"/>
+                      <a:r>
+                        <a:rPr lang="de-DE" sz="1200" dirty="0"/>
+                        <a:t>23</a:t>
+                      </a:r>
+                    </a:p>
+                  </a:txBody>
+                  <a:tcPr/>
+                </a:tc>
+                <a:tc>
+                  <a:txBody>
+                    <a:bodyPr/>
+                    <a:lstStyle/>
+                    <a:p>
+                      <a:pPr algn="ctr"/>
+                      <a:r>
+                        <a:rPr lang="de-DE" sz="1200" dirty="0"/>
+                        <a:t>0</a:t>
+                      </a:r>
+                    </a:p>
+                  </a:txBody>
+                  <a:tcPr/>
+                </a:tc>
+                <a:tc>
+                  <a:txBody>
+                    <a:bodyPr/>
+                    <a:lstStyle/>
+                    <a:p>
+                      <a:pPr algn="ctr"/>
+                      <a:r>
+                        <a:rPr lang="de-DE" sz="1200" dirty="0"/>
+                        <a:t>28</a:t>
+                      </a:r>
                     </a:p>
                   </a:txBody>
                   <a:tcPr/>
@@ -6496,29 +6529,38 @@
                     <a:lstStyle/>
                     <a:p>
                       <a:pPr algn="ctr"/>
-                      <a:endParaRPr lang="de-DE" sz="1200"/>
-                    </a:p>
-                  </a:txBody>
-                  <a:tcPr/>
-                </a:tc>
-                <a:tc>
-                  <a:txBody>
-                    <a:bodyPr/>
-                    <a:lstStyle/>
-                    <a:p>
-                      <a:pPr algn="ctr"/>
-                      <a:endParaRPr lang="de-DE" sz="1200" dirty="0"/>
-                    </a:p>
-                  </a:txBody>
-                  <a:tcPr/>
-                </a:tc>
-                <a:tc>
-                  <a:txBody>
-                    <a:bodyPr/>
-                    <a:lstStyle/>
-                    <a:p>
-                      <a:pPr algn="ctr"/>
-                      <a:endParaRPr lang="de-DE" sz="1200" dirty="0"/>
+                      <a:r>
+                        <a:rPr lang="de-DE" sz="1200" dirty="0"/>
+                        <a:t>23</a:t>
+                      </a:r>
+                    </a:p>
+                  </a:txBody>
+                  <a:tcPr/>
+                </a:tc>
+                <a:tc>
+                  <a:txBody>
+                    <a:bodyPr/>
+                    <a:lstStyle/>
+                    <a:p>
+                      <a:pPr algn="ctr"/>
+                      <a:r>
+                        <a:rPr lang="de-DE" sz="1200" dirty="0"/>
+                        <a:t>0</a:t>
+                      </a:r>
+                    </a:p>
+                  </a:txBody>
+                  <a:tcPr/>
+                </a:tc>
+                <a:tc>
+                  <a:txBody>
+                    <a:bodyPr/>
+                    <a:lstStyle/>
+                    <a:p>
+                      <a:pPr algn="ctr"/>
+                      <a:r>
+                        <a:rPr lang="de-DE" sz="1200" dirty="0"/>
+                        <a:t>28</a:t>
+                      </a:r>
                     </a:p>
                   </a:txBody>
                   <a:tcPr/>
@@ -6542,7 +6584,7 @@
           <p:nvPr>
             <p:extLst>
               <p:ext uri="{D42A27DB-BD31-4B8C-83A1-F6EECF244321}">
-                <p14:modId xmlns:p14="http://schemas.microsoft.com/office/powerpoint/2010/main" val="4087459146"/>
+                <p14:modId xmlns:p14="http://schemas.microsoft.com/office/powerpoint/2010/main" val="3954701598"/>
               </p:ext>
             </p:extLst>
           </p:nvPr>
@@ -6612,7 +6654,10 @@
                     <a:lstStyle/>
                     <a:p>
                       <a:pPr algn="ctr"/>
-                      <a:endParaRPr lang="de-DE" sz="1200" dirty="0"/>
+                      <a:r>
+                        <a:rPr lang="de-DE" sz="1200" dirty="0"/>
+                        <a:t>2</a:t>
+                      </a:r>
                     </a:p>
                   </a:txBody>
                   <a:tcPr/>
@@ -6630,29 +6675,38 @@
                     <a:lstStyle/>
                     <a:p>
                       <a:pPr algn="ctr"/>
-                      <a:endParaRPr lang="de-DE" sz="1200" dirty="0"/>
-                    </a:p>
-                  </a:txBody>
-                  <a:tcPr/>
-                </a:tc>
-                <a:tc>
-                  <a:txBody>
-                    <a:bodyPr/>
-                    <a:lstStyle/>
-                    <a:p>
-                      <a:pPr algn="ctr"/>
-                      <a:endParaRPr lang="de-DE" sz="1200" dirty="0"/>
-                    </a:p>
-                  </a:txBody>
-                  <a:tcPr/>
-                </a:tc>
-                <a:tc>
-                  <a:txBody>
-                    <a:bodyPr/>
-                    <a:lstStyle/>
-                    <a:p>
-                      <a:pPr algn="ctr"/>
-                      <a:endParaRPr lang="de-DE" sz="1200" dirty="0"/>
+                      <a:r>
+                        <a:rPr lang="de-DE" sz="1200" dirty="0"/>
+                        <a:t>28</a:t>
+                      </a:r>
+                    </a:p>
+                  </a:txBody>
+                  <a:tcPr/>
+                </a:tc>
+                <a:tc>
+                  <a:txBody>
+                    <a:bodyPr/>
+                    <a:lstStyle/>
+                    <a:p>
+                      <a:pPr algn="ctr"/>
+                      <a:r>
+                        <a:rPr lang="de-DE" sz="1200" dirty="0"/>
+                        <a:t>0</a:t>
+                      </a:r>
+                    </a:p>
+                  </a:txBody>
+                  <a:tcPr/>
+                </a:tc>
+                <a:tc>
+                  <a:txBody>
+                    <a:bodyPr/>
+                    <a:lstStyle/>
+                    <a:p>
+                      <a:pPr algn="ctr"/>
+                      <a:r>
+                        <a:rPr lang="de-DE" sz="1200" dirty="0"/>
+                        <a:t>30</a:t>
+                      </a:r>
                     </a:p>
                   </a:txBody>
                   <a:tcPr/>
@@ -6670,29 +6724,38 @@
                     <a:lstStyle/>
                     <a:p>
                       <a:pPr algn="ctr"/>
-                      <a:endParaRPr lang="de-DE" sz="1200"/>
-                    </a:p>
-                  </a:txBody>
-                  <a:tcPr/>
-                </a:tc>
-                <a:tc>
-                  <a:txBody>
-                    <a:bodyPr/>
-                    <a:lstStyle/>
-                    <a:p>
-                      <a:pPr algn="ctr"/>
-                      <a:endParaRPr lang="de-DE" sz="1200" dirty="0"/>
-                    </a:p>
-                  </a:txBody>
-                  <a:tcPr/>
-                </a:tc>
-                <a:tc>
-                  <a:txBody>
-                    <a:bodyPr/>
-                    <a:lstStyle/>
-                    <a:p>
-                      <a:pPr algn="ctr"/>
-                      <a:endParaRPr lang="de-DE" sz="1200" dirty="0"/>
+                      <a:r>
+                        <a:rPr lang="de-DE" sz="1200" dirty="0"/>
+                        <a:t>28</a:t>
+                      </a:r>
+                    </a:p>
+                  </a:txBody>
+                  <a:tcPr/>
+                </a:tc>
+                <a:tc>
+                  <a:txBody>
+                    <a:bodyPr/>
+                    <a:lstStyle/>
+                    <a:p>
+                      <a:pPr algn="ctr"/>
+                      <a:r>
+                        <a:rPr lang="de-DE" sz="1200" dirty="0"/>
+                        <a:t>0</a:t>
+                      </a:r>
+                    </a:p>
+                  </a:txBody>
+                  <a:tcPr/>
+                </a:tc>
+                <a:tc>
+                  <a:txBody>
+                    <a:bodyPr/>
+                    <a:lstStyle/>
+                    <a:p>
+                      <a:pPr algn="ctr"/>
+                      <a:r>
+                        <a:rPr lang="de-DE" sz="1200" dirty="0"/>
+                        <a:t>30</a:t>
+                      </a:r>
                     </a:p>
                   </a:txBody>
                   <a:tcPr/>
@@ -6716,7 +6779,7 @@
           <p:nvPr>
             <p:extLst>
               <p:ext uri="{D42A27DB-BD31-4B8C-83A1-F6EECF244321}">
-                <p14:modId xmlns:p14="http://schemas.microsoft.com/office/powerpoint/2010/main" val="2992054961"/>
+                <p14:modId xmlns:p14="http://schemas.microsoft.com/office/powerpoint/2010/main" val="197569945"/>
               </p:ext>
             </p:extLst>
           </p:nvPr>
@@ -6786,7 +6849,10 @@
                     <a:lstStyle/>
                     <a:p>
                       <a:pPr algn="ctr"/>
-                      <a:endParaRPr lang="de-DE" sz="1200" dirty="0"/>
+                      <a:r>
+                        <a:rPr lang="de-DE" sz="1200" dirty="0"/>
+                        <a:t>3</a:t>
+                      </a:r>
                     </a:p>
                   </a:txBody>
                   <a:tcPr/>
@@ -6804,29 +6870,38 @@
                     <a:lstStyle/>
                     <a:p>
                       <a:pPr algn="ctr"/>
-                      <a:endParaRPr lang="de-DE" sz="1200" dirty="0"/>
-                    </a:p>
-                  </a:txBody>
-                  <a:tcPr/>
-                </a:tc>
-                <a:tc>
-                  <a:txBody>
-                    <a:bodyPr/>
-                    <a:lstStyle/>
-                    <a:p>
-                      <a:pPr algn="ctr"/>
-                      <a:endParaRPr lang="de-DE" sz="1200" dirty="0"/>
-                    </a:p>
-                  </a:txBody>
-                  <a:tcPr/>
-                </a:tc>
-                <a:tc>
-                  <a:txBody>
-                    <a:bodyPr/>
-                    <a:lstStyle/>
-                    <a:p>
-                      <a:pPr algn="ctr"/>
-                      <a:endParaRPr lang="de-DE" sz="1200" dirty="0"/>
+                      <a:r>
+                        <a:rPr lang="de-DE" sz="1200" dirty="0"/>
+                        <a:t>0</a:t>
+                      </a:r>
+                    </a:p>
+                  </a:txBody>
+                  <a:tcPr/>
+                </a:tc>
+                <a:tc>
+                  <a:txBody>
+                    <a:bodyPr/>
+                    <a:lstStyle/>
+                    <a:p>
+                      <a:pPr algn="ctr"/>
+                      <a:r>
+                        <a:rPr lang="de-DE" sz="1200" dirty="0"/>
+                        <a:t>0</a:t>
+                      </a:r>
+                    </a:p>
+                  </a:txBody>
+                  <a:tcPr/>
+                </a:tc>
+                <a:tc>
+                  <a:txBody>
+                    <a:bodyPr/>
+                    <a:lstStyle/>
+                    <a:p>
+                      <a:pPr algn="ctr"/>
+                      <a:r>
+                        <a:rPr lang="de-DE" sz="1200" dirty="0"/>
+                        <a:t>3</a:t>
+                      </a:r>
                     </a:p>
                   </a:txBody>
                   <a:tcPr/>
@@ -6844,29 +6919,38 @@
                     <a:lstStyle/>
                     <a:p>
                       <a:pPr algn="ctr"/>
-                      <a:endParaRPr lang="de-DE" sz="1200"/>
-                    </a:p>
-                  </a:txBody>
-                  <a:tcPr/>
-                </a:tc>
-                <a:tc>
-                  <a:txBody>
-                    <a:bodyPr/>
-                    <a:lstStyle/>
-                    <a:p>
-                      <a:pPr algn="ctr"/>
-                      <a:endParaRPr lang="de-DE" sz="1200" dirty="0"/>
-                    </a:p>
-                  </a:txBody>
-                  <a:tcPr/>
-                </a:tc>
-                <a:tc>
-                  <a:txBody>
-                    <a:bodyPr/>
-                    <a:lstStyle/>
-                    <a:p>
-                      <a:pPr algn="ctr"/>
-                      <a:endParaRPr lang="de-DE" sz="1200" dirty="0"/>
+                      <a:r>
+                        <a:rPr lang="de-DE" sz="1200" dirty="0"/>
+                        <a:t>0</a:t>
+                      </a:r>
+                    </a:p>
+                  </a:txBody>
+                  <a:tcPr/>
+                </a:tc>
+                <a:tc>
+                  <a:txBody>
+                    <a:bodyPr/>
+                    <a:lstStyle/>
+                    <a:p>
+                      <a:pPr algn="ctr"/>
+                      <a:r>
+                        <a:rPr lang="de-DE" sz="1200" dirty="0"/>
+                        <a:t>0</a:t>
+                      </a:r>
+                    </a:p>
+                  </a:txBody>
+                  <a:tcPr/>
+                </a:tc>
+                <a:tc>
+                  <a:txBody>
+                    <a:bodyPr/>
+                    <a:lstStyle/>
+                    <a:p>
+                      <a:pPr algn="ctr"/>
+                      <a:r>
+                        <a:rPr lang="de-DE" sz="1200" dirty="0"/>
+                        <a:t>3</a:t>
+                      </a:r>
                     </a:p>
                   </a:txBody>
                   <a:tcPr/>
@@ -6890,7 +6974,7 @@
           <p:nvPr>
             <p:extLst>
               <p:ext uri="{D42A27DB-BD31-4B8C-83A1-F6EECF244321}">
-                <p14:modId xmlns:p14="http://schemas.microsoft.com/office/powerpoint/2010/main" val="3748462714"/>
+                <p14:modId xmlns:p14="http://schemas.microsoft.com/office/powerpoint/2010/main" val="597109807"/>
               </p:ext>
             </p:extLst>
           </p:nvPr>
@@ -6960,7 +7044,10 @@
                     <a:lstStyle/>
                     <a:p>
                       <a:pPr algn="ctr"/>
-                      <a:endParaRPr lang="de-DE" sz="1200" dirty="0"/>
+                      <a:r>
+                        <a:rPr lang="de-DE" sz="1200" dirty="0"/>
+                        <a:t>10</a:t>
+                      </a:r>
                     </a:p>
                   </a:txBody>
                   <a:tcPr/>
@@ -6978,29 +7065,38 @@
                     <a:lstStyle/>
                     <a:p>
                       <a:pPr algn="ctr"/>
-                      <a:endParaRPr lang="de-DE" sz="1200" dirty="0"/>
-                    </a:p>
-                  </a:txBody>
-                  <a:tcPr/>
-                </a:tc>
-                <a:tc>
-                  <a:txBody>
-                    <a:bodyPr/>
-                    <a:lstStyle/>
-                    <a:p>
-                      <a:pPr algn="ctr"/>
-                      <a:endParaRPr lang="de-DE" sz="1200" dirty="0"/>
-                    </a:p>
-                  </a:txBody>
-                  <a:tcPr/>
-                </a:tc>
-                <a:tc>
-                  <a:txBody>
-                    <a:bodyPr/>
-                    <a:lstStyle/>
-                    <a:p>
-                      <a:pPr algn="ctr"/>
-                      <a:endParaRPr lang="de-DE" sz="1200" dirty="0"/>
+                      <a:r>
+                        <a:rPr lang="de-DE" sz="1200" dirty="0"/>
+                        <a:t>3</a:t>
+                      </a:r>
+                    </a:p>
+                  </a:txBody>
+                  <a:tcPr/>
+                </a:tc>
+                <a:tc>
+                  <a:txBody>
+                    <a:bodyPr/>
+                    <a:lstStyle/>
+                    <a:p>
+                      <a:pPr algn="ctr"/>
+                      <a:r>
+                        <a:rPr lang="de-DE" sz="1200" dirty="0"/>
+                        <a:t>0</a:t>
+                      </a:r>
+                    </a:p>
+                  </a:txBody>
+                  <a:tcPr/>
+                </a:tc>
+                <a:tc>
+                  <a:txBody>
+                    <a:bodyPr/>
+                    <a:lstStyle/>
+                    <a:p>
+                      <a:pPr algn="ctr"/>
+                      <a:r>
+                        <a:rPr lang="de-DE" sz="1200" dirty="0"/>
+                        <a:t>13</a:t>
+                      </a:r>
                     </a:p>
                   </a:txBody>
                   <a:tcPr/>
@@ -7018,29 +7114,38 @@
                     <a:lstStyle/>
                     <a:p>
                       <a:pPr algn="ctr"/>
-                      <a:endParaRPr lang="de-DE" sz="1200"/>
-                    </a:p>
-                  </a:txBody>
-                  <a:tcPr/>
-                </a:tc>
-                <a:tc>
-                  <a:txBody>
-                    <a:bodyPr/>
-                    <a:lstStyle/>
-                    <a:p>
-                      <a:pPr algn="ctr"/>
-                      <a:endParaRPr lang="de-DE" sz="1200" dirty="0"/>
-                    </a:p>
-                  </a:txBody>
-                  <a:tcPr/>
-                </a:tc>
-                <a:tc>
-                  <a:txBody>
-                    <a:bodyPr/>
-                    <a:lstStyle/>
-                    <a:p>
-                      <a:pPr algn="ctr"/>
-                      <a:endParaRPr lang="de-DE" sz="1200" dirty="0"/>
+                      <a:r>
+                        <a:rPr lang="de-DE" sz="1200" dirty="0"/>
+                        <a:t>3</a:t>
+                      </a:r>
+                    </a:p>
+                  </a:txBody>
+                  <a:tcPr/>
+                </a:tc>
+                <a:tc>
+                  <a:txBody>
+                    <a:bodyPr/>
+                    <a:lstStyle/>
+                    <a:p>
+                      <a:pPr algn="ctr"/>
+                      <a:r>
+                        <a:rPr lang="de-DE" sz="1200" dirty="0"/>
+                        <a:t>0</a:t>
+                      </a:r>
+                    </a:p>
+                  </a:txBody>
+                  <a:tcPr/>
+                </a:tc>
+                <a:tc>
+                  <a:txBody>
+                    <a:bodyPr/>
+                    <a:lstStyle/>
+                    <a:p>
+                      <a:pPr algn="ctr"/>
+                      <a:r>
+                        <a:rPr lang="de-DE" sz="1200" dirty="0"/>
+                        <a:t>13</a:t>
+                      </a:r>
                     </a:p>
                   </a:txBody>
                   <a:tcPr/>
@@ -7064,7 +7169,7 @@
           <p:nvPr>
             <p:extLst>
               <p:ext uri="{D42A27DB-BD31-4B8C-83A1-F6EECF244321}">
-                <p14:modId xmlns:p14="http://schemas.microsoft.com/office/powerpoint/2010/main" val="2559734300"/>
+                <p14:modId xmlns:p14="http://schemas.microsoft.com/office/powerpoint/2010/main" val="2586410203"/>
               </p:ext>
             </p:extLst>
           </p:nvPr>
@@ -7134,7 +7239,10 @@
                     <a:lstStyle/>
                     <a:p>
                       <a:pPr algn="ctr"/>
-                      <a:endParaRPr lang="de-DE" sz="1200" dirty="0"/>
+                      <a:r>
+                        <a:rPr lang="de-DE" sz="1200" dirty="0"/>
+                        <a:t>7</a:t>
+                      </a:r>
                     </a:p>
                   </a:txBody>
                   <a:tcPr/>
@@ -7152,29 +7260,38 @@
                     <a:lstStyle/>
                     <a:p>
                       <a:pPr algn="ctr"/>
-                      <a:endParaRPr lang="de-DE" sz="1200" dirty="0"/>
-                    </a:p>
-                  </a:txBody>
-                  <a:tcPr/>
-                </a:tc>
-                <a:tc>
-                  <a:txBody>
-                    <a:bodyPr/>
-                    <a:lstStyle/>
-                    <a:p>
-                      <a:pPr algn="ctr"/>
-                      <a:endParaRPr lang="de-DE" sz="1200" dirty="0"/>
-                    </a:p>
-                  </a:txBody>
-                  <a:tcPr/>
-                </a:tc>
-                <a:tc>
-                  <a:txBody>
-                    <a:bodyPr/>
-                    <a:lstStyle/>
-                    <a:p>
-                      <a:pPr algn="ctr"/>
-                      <a:endParaRPr lang="de-DE" sz="1200" dirty="0"/>
+                      <a:r>
+                        <a:rPr lang="de-DE" sz="1200" dirty="0"/>
+                        <a:t>3</a:t>
+                      </a:r>
+                    </a:p>
+                  </a:txBody>
+                  <a:tcPr/>
+                </a:tc>
+                <a:tc>
+                  <a:txBody>
+                    <a:bodyPr/>
+                    <a:lstStyle/>
+                    <a:p>
+                      <a:pPr algn="ctr"/>
+                      <a:r>
+                        <a:rPr lang="de-DE" sz="1200" dirty="0"/>
+                        <a:t>3</a:t>
+                      </a:r>
+                    </a:p>
+                  </a:txBody>
+                  <a:tcPr/>
+                </a:tc>
+                <a:tc>
+                  <a:txBody>
+                    <a:bodyPr/>
+                    <a:lstStyle/>
+                    <a:p>
+                      <a:pPr algn="ctr"/>
+                      <a:r>
+                        <a:rPr lang="de-DE" sz="1200" dirty="0"/>
+                        <a:t>10</a:t>
+                      </a:r>
                     </a:p>
                   </a:txBody>
                   <a:tcPr/>
@@ -7192,29 +7309,38 @@
                     <a:lstStyle/>
                     <a:p>
                       <a:pPr algn="ctr"/>
-                      <a:endParaRPr lang="de-DE" sz="1200"/>
-                    </a:p>
-                  </a:txBody>
-                  <a:tcPr/>
-                </a:tc>
-                <a:tc>
-                  <a:txBody>
-                    <a:bodyPr/>
-                    <a:lstStyle/>
-                    <a:p>
-                      <a:pPr algn="ctr"/>
-                      <a:endParaRPr lang="de-DE" sz="1200" dirty="0"/>
-                    </a:p>
-                  </a:txBody>
-                  <a:tcPr/>
-                </a:tc>
-                <a:tc>
-                  <a:txBody>
-                    <a:bodyPr/>
-                    <a:lstStyle/>
-                    <a:p>
-                      <a:pPr algn="ctr"/>
-                      <a:endParaRPr lang="de-DE" sz="1200" dirty="0"/>
+                      <a:r>
+                        <a:rPr lang="de-DE" sz="1200" dirty="0"/>
+                        <a:t>6</a:t>
+                      </a:r>
+                    </a:p>
+                  </a:txBody>
+                  <a:tcPr/>
+                </a:tc>
+                <a:tc>
+                  <a:txBody>
+                    <a:bodyPr/>
+                    <a:lstStyle/>
+                    <a:p>
+                      <a:pPr algn="ctr"/>
+                      <a:r>
+                        <a:rPr lang="de-DE" sz="1200" dirty="0"/>
+                        <a:t>3</a:t>
+                      </a:r>
+                    </a:p>
+                  </a:txBody>
+                  <a:tcPr/>
+                </a:tc>
+                <a:tc>
+                  <a:txBody>
+                    <a:bodyPr/>
+                    <a:lstStyle/>
+                    <a:p>
+                      <a:pPr algn="ctr"/>
+                      <a:r>
+                        <a:rPr lang="de-DE" sz="1200" dirty="0"/>
+                        <a:t>13</a:t>
+                      </a:r>
                     </a:p>
                   </a:txBody>
                   <a:tcPr/>
@@ -7238,7 +7364,7 @@
           <p:nvPr>
             <p:extLst>
               <p:ext uri="{D42A27DB-BD31-4B8C-83A1-F6EECF244321}">
-                <p14:modId xmlns:p14="http://schemas.microsoft.com/office/powerpoint/2010/main" val="2944723501"/>
+                <p14:modId xmlns:p14="http://schemas.microsoft.com/office/powerpoint/2010/main" val="360612240"/>
               </p:ext>
             </p:extLst>
           </p:nvPr>
@@ -7308,7 +7434,10 @@
                     <a:lstStyle/>
                     <a:p>
                       <a:pPr algn="ctr"/>
-                      <a:endParaRPr lang="de-DE" sz="1200" dirty="0"/>
+                      <a:r>
+                        <a:rPr lang="de-DE" sz="1200" dirty="0"/>
+                        <a:t>2</a:t>
+                      </a:r>
                     </a:p>
                   </a:txBody>
                   <a:tcPr/>
@@ -7326,29 +7455,38 @@
                     <a:lstStyle/>
                     <a:p>
                       <a:pPr algn="ctr"/>
-                      <a:endParaRPr lang="de-DE" sz="1200" dirty="0"/>
-                    </a:p>
-                  </a:txBody>
-                  <a:tcPr/>
-                </a:tc>
-                <a:tc>
-                  <a:txBody>
-                    <a:bodyPr/>
-                    <a:lstStyle/>
-                    <a:p>
-                      <a:pPr algn="ctr"/>
-                      <a:endParaRPr lang="de-DE" sz="1200" dirty="0"/>
-                    </a:p>
-                  </a:txBody>
-                  <a:tcPr/>
-                </a:tc>
-                <a:tc>
-                  <a:txBody>
-                    <a:bodyPr/>
-                    <a:lstStyle/>
-                    <a:p>
-                      <a:pPr algn="ctr"/>
-                      <a:endParaRPr lang="de-DE" sz="1200" dirty="0"/>
+                      <a:r>
+                        <a:rPr lang="de-DE" sz="1200" dirty="0"/>
+                        <a:t>3</a:t>
+                      </a:r>
+                    </a:p>
+                  </a:txBody>
+                  <a:tcPr/>
+                </a:tc>
+                <a:tc>
+                  <a:txBody>
+                    <a:bodyPr/>
+                    <a:lstStyle/>
+                    <a:p>
+                      <a:pPr algn="ctr"/>
+                      <a:r>
+                        <a:rPr lang="de-DE" sz="1200" dirty="0"/>
+                        <a:t>8</a:t>
+                      </a:r>
+                    </a:p>
+                  </a:txBody>
+                  <a:tcPr/>
+                </a:tc>
+                <a:tc>
+                  <a:txBody>
+                    <a:bodyPr/>
+                    <a:lstStyle/>
+                    <a:p>
+                      <a:pPr algn="ctr"/>
+                      <a:r>
+                        <a:rPr lang="de-DE" sz="1200" dirty="0"/>
+                        <a:t>5</a:t>
+                      </a:r>
                     </a:p>
                   </a:txBody>
                   <a:tcPr/>
@@ -7366,29 +7504,38 @@
                     <a:lstStyle/>
                     <a:p>
                       <a:pPr algn="ctr"/>
-                      <a:endParaRPr lang="de-DE" sz="1200"/>
-                    </a:p>
-                  </a:txBody>
-                  <a:tcPr/>
-                </a:tc>
-                <a:tc>
-                  <a:txBody>
-                    <a:bodyPr/>
-                    <a:lstStyle/>
-                    <a:p>
-                      <a:pPr algn="ctr"/>
-                      <a:endParaRPr lang="de-DE" sz="1200" dirty="0"/>
-                    </a:p>
-                  </a:txBody>
-                  <a:tcPr/>
-                </a:tc>
-                <a:tc>
-                  <a:txBody>
-                    <a:bodyPr/>
-                    <a:lstStyle/>
-                    <a:p>
-                      <a:pPr algn="ctr"/>
-                      <a:endParaRPr lang="de-DE" sz="1200" dirty="0"/>
+                      <a:r>
+                        <a:rPr lang="de-DE" sz="1200" dirty="0"/>
+                        <a:t>11</a:t>
+                      </a:r>
+                    </a:p>
+                  </a:txBody>
+                  <a:tcPr/>
+                </a:tc>
+                <a:tc>
+                  <a:txBody>
+                    <a:bodyPr/>
+                    <a:lstStyle/>
+                    <a:p>
+                      <a:pPr algn="ctr"/>
+                      <a:r>
+                        <a:rPr lang="de-DE" sz="1200" dirty="0"/>
+                        <a:t>0</a:t>
+                      </a:r>
+                    </a:p>
+                  </a:txBody>
+                  <a:tcPr/>
+                </a:tc>
+                <a:tc>
+                  <a:txBody>
+                    <a:bodyPr/>
+                    <a:lstStyle/>
+                    <a:p>
+                      <a:pPr algn="ctr"/>
+                      <a:r>
+                        <a:rPr lang="de-DE" sz="1200" dirty="0"/>
+                        <a:t>13</a:t>
+                      </a:r>
                     </a:p>
                   </a:txBody>
                   <a:tcPr/>
@@ -7412,7 +7559,7 @@
           <p:nvPr>
             <p:extLst>
               <p:ext uri="{D42A27DB-BD31-4B8C-83A1-F6EECF244321}">
-                <p14:modId xmlns:p14="http://schemas.microsoft.com/office/powerpoint/2010/main" val="116373800"/>
+                <p14:modId xmlns:p14="http://schemas.microsoft.com/office/powerpoint/2010/main" val="274258362"/>
               </p:ext>
             </p:extLst>
           </p:nvPr>
@@ -7500,29 +7647,38 @@
                     <a:lstStyle/>
                     <a:p>
                       <a:pPr algn="ctr"/>
-                      <a:endParaRPr lang="de-DE" sz="1200" dirty="0"/>
-                    </a:p>
-                  </a:txBody>
-                  <a:tcPr/>
-                </a:tc>
-                <a:tc>
-                  <a:txBody>
-                    <a:bodyPr/>
-                    <a:lstStyle/>
-                    <a:p>
-                      <a:pPr algn="ctr"/>
-                      <a:endParaRPr lang="de-DE" sz="1200" dirty="0"/>
-                    </a:p>
-                  </a:txBody>
-                  <a:tcPr/>
-                </a:tc>
-                <a:tc>
-                  <a:txBody>
-                    <a:bodyPr/>
-                    <a:lstStyle/>
-                    <a:p>
-                      <a:pPr algn="ctr"/>
-                      <a:endParaRPr lang="de-DE" sz="1200" dirty="0"/>
+                      <a:r>
+                        <a:rPr lang="de-DE" sz="1200" dirty="0"/>
+                        <a:t>5</a:t>
+                      </a:r>
+                    </a:p>
+                  </a:txBody>
+                  <a:tcPr/>
+                </a:tc>
+                <a:tc>
+                  <a:txBody>
+                    <a:bodyPr/>
+                    <a:lstStyle/>
+                    <a:p>
+                      <a:pPr algn="ctr"/>
+                      <a:r>
+                        <a:rPr lang="de-DE" sz="1200" dirty="0"/>
+                        <a:t>10</a:t>
+                      </a:r>
+                    </a:p>
+                  </a:txBody>
+                  <a:tcPr/>
+                </a:tc>
+                <a:tc>
+                  <a:txBody>
+                    <a:bodyPr/>
+                    <a:lstStyle/>
+                    <a:p>
+                      <a:pPr algn="ctr"/>
+                      <a:r>
+                        <a:rPr lang="de-DE" sz="1200" dirty="0"/>
+                        <a:t>13</a:t>
+                      </a:r>
                     </a:p>
                   </a:txBody>
                   <a:tcPr/>
@@ -7540,29 +7696,38 @@
                     <a:lstStyle/>
                     <a:p>
                       <a:pPr algn="ctr"/>
-                      <a:endParaRPr lang="de-DE" sz="1200"/>
-                    </a:p>
-                  </a:txBody>
-                  <a:tcPr/>
-                </a:tc>
-                <a:tc>
-                  <a:txBody>
-                    <a:bodyPr/>
-                    <a:lstStyle/>
-                    <a:p>
-                      <a:pPr algn="ctr"/>
-                      <a:endParaRPr lang="de-DE" sz="1200" dirty="0"/>
-                    </a:p>
-                  </a:txBody>
-                  <a:tcPr/>
-                </a:tc>
-                <a:tc>
-                  <a:txBody>
-                    <a:bodyPr/>
-                    <a:lstStyle/>
-                    <a:p>
-                      <a:pPr algn="ctr"/>
-                      <a:endParaRPr lang="de-DE" sz="1200" dirty="0"/>
+                      <a:r>
+                        <a:rPr lang="de-DE" sz="1200" dirty="0"/>
+                        <a:t>15</a:t>
+                      </a:r>
+                    </a:p>
+                  </a:txBody>
+                  <a:tcPr/>
+                </a:tc>
+                <a:tc>
+                  <a:txBody>
+                    <a:bodyPr/>
+                    <a:lstStyle/>
+                    <a:p>
+                      <a:pPr algn="ctr"/>
+                      <a:r>
+                        <a:rPr lang="de-DE" sz="1200" dirty="0"/>
+                        <a:t>10</a:t>
+                      </a:r>
+                    </a:p>
+                  </a:txBody>
+                  <a:tcPr/>
+                </a:tc>
+                <a:tc>
+                  <a:txBody>
+                    <a:bodyPr/>
+                    <a:lstStyle/>
+                    <a:p>
+                      <a:pPr algn="ctr"/>
+                      <a:r>
+                        <a:rPr lang="de-DE" sz="1200" dirty="0"/>
+                        <a:t>23</a:t>
+                      </a:r>
                     </a:p>
                   </a:txBody>
                   <a:tcPr/>
@@ -7620,6 +7785,7 @@
         <p:nvCxnSpPr>
           <p:cNvPr id="13" name="Gewinkelte Verbindung 12"/>
           <p:cNvCxnSpPr>
+            <a:cxnSpLocks/>
             <a:stCxn id="7" idx="3"/>
             <a:endCxn id="10" idx="1"/>
           </p:cNvCxnSpPr>
@@ -7701,6 +7867,7 @@
         <p:nvCxnSpPr>
           <p:cNvPr id="15" name="Gewinkelte Verbindung 14"/>
           <p:cNvCxnSpPr>
+            <a:cxnSpLocks/>
             <a:stCxn id="7" idx="3"/>
             <a:endCxn id="8" idx="1"/>
           </p:cNvCxnSpPr>
@@ -7718,7 +7885,7 @@
           </a:prstGeom>
           <a:ln>
             <a:solidFill>
-              <a:schemeClr val="tx1"/>
+              <a:srgbClr val="FF0000"/>
             </a:solidFill>
             <a:tailEnd type="triangle"/>
           </a:ln>
@@ -7759,7 +7926,7 @@
           </a:prstGeom>
           <a:ln w="9525" cmpd="sng">
             <a:solidFill>
-              <a:schemeClr val="tx1"/>
+              <a:srgbClr val="FF0000"/>
             </a:solidFill>
             <a:tailEnd type="triangle"/>
           </a:ln>
@@ -7879,7 +8046,7 @@
           </a:prstGeom>
           <a:ln w="9525" cmpd="sng">
             <a:solidFill>
-              <a:schemeClr val="tx1"/>
+              <a:srgbClr val="FF0000"/>
             </a:solidFill>
             <a:tailEnd type="triangle" w="med" len="med"/>
           </a:ln>
@@ -7961,7 +8128,7 @@
           </a:prstGeom>
           <a:ln w="9525" cmpd="sng">
             <a:solidFill>
-              <a:schemeClr val="tx1"/>
+              <a:srgbClr val="FF0000"/>
             </a:solidFill>
             <a:tailEnd type="triangle"/>
           </a:ln>
@@ -8581,21 +8748,8 @@
                   <a:srgbClr val="262626"/>
                 </a:solidFill>
               </a:rPr>
-              <a:t>FP = niedrigster FAZ (Nachfolger) </a:t>
-            </a:r>
-            <a:r>
-              <a:rPr lang="de-DE" i="1">
-                <a:solidFill>
-                  <a:srgbClr val="262626"/>
-                </a:solidFill>
-              </a:rPr>
-              <a:t>– FEZ</a:t>
-            </a:r>
-            <a:endParaRPr lang="de-DE" i="1" dirty="0">
-              <a:solidFill>
-                <a:srgbClr val="262626"/>
-              </a:solidFill>
-            </a:endParaRPr>
+              <a:t>FP = niedrigster FAZ (Nachfolger) – FEZ</a:t>
+            </a:r>
           </a:p>
           <a:p>
             <a:pPr marL="342900" indent="-342900">
@@ -9224,6 +9378,15 @@
 </file>
 
 <file path=customXml/item1.xml><?xml version="1.0" encoding="utf-8"?>
+<?mso-contentType ?>
+<FormTemplates xmlns="http://schemas.microsoft.com/sharepoint/v3/contenttype/forms">
+  <Display>DocumentLibraryForm</Display>
+  <Edit>DocumentLibraryForm</Edit>
+  <New>DocumentLibraryForm</New>
+</FormTemplates>
+</file>
+
+<file path=customXml/item2.xml><?xml version="1.0" encoding="utf-8"?>
 <ct:contentTypeSchema xmlns:ct="http://schemas.microsoft.com/office/2006/metadata/contentType" xmlns:ma="http://schemas.microsoft.com/office/2006/metadata/properties/metaAttributes" ct:_="" ma:_="" ma:contentTypeName="Dokument" ma:contentTypeID="0x01010016F104835879FF45A7E5FDA3A670650C" ma:contentTypeVersion="4" ma:contentTypeDescription="Ein neues Dokument erstellen." ma:contentTypeScope="" ma:versionID="7300f8ba3a8f2154af6d391ad24a5dea">
   <xsd:schema xmlns:xsd="http://www.w3.org/2001/XMLSchema" xmlns:xs="http://www.w3.org/2001/XMLSchema" xmlns:p="http://schemas.microsoft.com/office/2006/metadata/properties" xmlns:ns2="05314fb4-28bc-450e-b417-8482f3e039a7" targetNamespace="http://schemas.microsoft.com/office/2006/metadata/properties" ma:root="true" ma:fieldsID="e6a171a3c6f6069581a35084a07c63b0" ns2:_="">
     <xsd:import namespace="05314fb4-28bc-450e-b417-8482f3e039a7"/>
@@ -9367,19 +9530,28 @@
 </ct:contentTypeSchema>
 </file>
 
-<file path=customXml/item2.xml><?xml version="1.0" encoding="utf-8"?>
-<?mso-contentType ?>
-<FormTemplates xmlns="http://schemas.microsoft.com/sharepoint/v3/contenttype/forms">
-  <Display>DocumentLibraryForm</Display>
-  <Edit>DocumentLibraryForm</Edit>
-  <New>DocumentLibraryForm</New>
-</FormTemplates>
-</file>
-
 <file path=customXml/itemProps1.xml><?xml version="1.0" encoding="utf-8"?>
-<ds:datastoreItem xmlns:ds="http://schemas.openxmlformats.org/officeDocument/2006/customXml" ds:itemID="{F3FF2F2D-AEED-4A35-A51F-CA5114856F5B}"/>
+<ds:datastoreItem xmlns:ds="http://schemas.openxmlformats.org/officeDocument/2006/customXml" ds:itemID="{36F6B345-15D7-4614-9BAD-E21F6D31F35E}">
+  <ds:schemaRefs>
+    <ds:schemaRef ds:uri="http://schemas.microsoft.com/sharepoint/v3/contenttype/forms"/>
+  </ds:schemaRefs>
+</ds:datastoreItem>
 </file>
 
 <file path=customXml/itemProps2.xml><?xml version="1.0" encoding="utf-8"?>
-<ds:datastoreItem xmlns:ds="http://schemas.openxmlformats.org/officeDocument/2006/customXml" ds:itemID="{36F6B345-15D7-4614-9BAD-E21F6D31F35E}"/>
+<ds:datastoreItem xmlns:ds="http://schemas.openxmlformats.org/officeDocument/2006/customXml" ds:itemID="{F3FF2F2D-AEED-4A35-A51F-CA5114856F5B}">
+  <ds:schemaRefs>
+    <ds:schemaRef ds:uri="http://schemas.microsoft.com/office/2006/metadata/contentType"/>
+    <ds:schemaRef ds:uri="http://schemas.microsoft.com/office/2006/metadata/properties/metaAttributes"/>
+    <ds:schemaRef ds:uri="http://www.w3.org/2001/XMLSchema"/>
+    <ds:schemaRef ds:uri="http://schemas.microsoft.com/office/2006/metadata/properties"/>
+    <ds:schemaRef ds:uri="05314fb4-28bc-450e-b417-8482f3e039a7"/>
+    <ds:schemaRef ds:uri="http://schemas.microsoft.com/office/2006/documentManagement/types"/>
+    <ds:schemaRef ds:uri="http://schemas.microsoft.com/office/infopath/2007/PartnerControls"/>
+    <ds:schemaRef ds:uri="http://schemas.openxmlformats.org/package/2006/metadata/core-properties"/>
+    <ds:schemaRef ds:uri="http://purl.org/dc/elements/1.1/"/>
+    <ds:schemaRef ds:uri="http://purl.org/dc/terms/"/>
+    <ds:schemaRef ds:uri="http://schemas.microsoft.com/internal/obd"/>
+  </ds:schemaRefs>
+</ds:datastoreItem>
 </file>
</xml_diff>